<commit_message>
More pptx add ons
</commit_message>
<xml_diff>
--- a/Shapiro 2025 Project/Weekly Updates/Week 1 Update.pptx
+++ b/Shapiro 2025 Project/Weekly Updates/Week 1 Update.pptx
@@ -13747,17 +13747,8 @@
           <a:p>
             <a:r>
               <a:rPr lang="en-US" dirty="0"/>
-              <a:t>mRNA Expression Cell </a:t>
+              <a:t>mRNA Expression Cell identification </a:t>
             </a:r>
-            <a:r>
-              <a:rPr lang="en-US" dirty="0" err="1"/>
-              <a:t>identifcation</a:t>
-            </a:r>
-            <a:r>
-              <a:rPr lang="en-US"/>
-              <a:t> </a:t>
-            </a:r>
-            <a:endParaRPr lang="en-US" dirty="0"/>
           </a:p>
         </p:txBody>
       </p:sp>
@@ -13782,7 +13773,7 @@
           <a:bodyPr/>
           <a:lstStyle/>
           <a:p>
-            <a:endParaRPr lang="en-US"/>
+            <a:endParaRPr lang="en-US" dirty="0"/>
           </a:p>
         </p:txBody>
       </p:sp>

</xml_diff>